<commit_message>
Update UG command syntax image and some phrasing
</commit_message>
<xml_diff>
--- a/docs/diagrams/command syntax.pptx
+++ b/docs/diagrams/command syntax.pptx
@@ -104,6 +104,11 @@
       </a:defRPr>
     </a:lvl9pPr>
   </p:defaultTextStyle>
+  <p:extLst>
+    <p:ext uri="{EFAFB233-063F-42B5-8137-9DF3F51BA10A}">
+      <p15:sldGuideLst xmlns:p15="http://schemas.microsoft.com/office/powerpoint/2012/main"/>
+    </p:ext>
+  </p:extLst>
 </p:presentation>
 </file>
 
@@ -4528,7 +4533,7 @@
         </p:nvSpPr>
         <p:spPr>
           <a:xfrm>
-            <a:off x="8959045" y="5237092"/>
+            <a:off x="9243403" y="5238626"/>
             <a:ext cx="498470" cy="369332"/>
           </a:xfrm>
           <a:prstGeom prst="rect">
@@ -4574,12 +4579,12 @@
         </p:nvSpPr>
         <p:spPr>
           <a:xfrm rot="16200000">
-            <a:off x="9118972" y="3942842"/>
-            <a:ext cx="220159" cy="2145305"/>
+            <a:off x="9303833" y="4091104"/>
+            <a:ext cx="258677" cy="1737065"/>
           </a:xfrm>
           <a:prstGeom prst="leftBrace">
             <a:avLst>
-              <a:gd name="adj1" fmla="val 42816"/>
+              <a:gd name="adj1" fmla="val 97200"/>
               <a:gd name="adj2" fmla="val 50000"/>
             </a:avLst>
           </a:prstGeom>

</xml_diff>